<commit_message>
starting and stopping work i think
</commit_message>
<xml_diff>
--- a/Songbook/Songbook/poster.pptx
+++ b/Songbook/Songbook/poster.pptx
@@ -5451,7 +5451,7 @@
               <a:graphicData uri="http://schemas.openxmlformats.org/presentationml/2006/ole">
                 <mc:AlternateContent xmlns:mc="http://schemas.openxmlformats.org/markup-compatibility/2006">
                   <mc:Choice xmlns:v="urn:schemas-microsoft-com:vml" Requires="v">
-                    <p:oleObj spid="_x0000_s1115" name="Image" r:id="rId8" imgW="1828440" imgH="1117440" progId="Photoshop.Image.13">
+                    <p:oleObj spid="_x0000_s1128" name="Image" r:id="rId8" imgW="1828440" imgH="1117440" progId="Photoshop.Image.13">
                       <p:embed/>
                     </p:oleObj>
                   </mc:Choice>
@@ -5508,7 +5508,7 @@
               <a:graphicData uri="http://schemas.openxmlformats.org/presentationml/2006/ole">
                 <mc:AlternateContent xmlns:mc="http://schemas.openxmlformats.org/markup-compatibility/2006">
                   <mc:Choice xmlns:v="urn:schemas-microsoft-com:vml" Requires="v">
-                    <p:oleObj spid="_x0000_s1116" name="Image" r:id="rId10" imgW="1828440" imgH="1117440" progId="Photoshop.Image.13">
+                    <p:oleObj spid="_x0000_s1129" name="Image" r:id="rId10" imgW="1828440" imgH="1117440" progId="Photoshop.Image.13">
                       <p:embed/>
                     </p:oleObj>
                   </mc:Choice>
@@ -6636,7 +6636,7 @@
             <a:graphicData uri="http://schemas.openxmlformats.org/presentationml/2006/ole">
               <mc:AlternateContent xmlns:mc="http://schemas.openxmlformats.org/markup-compatibility/2006">
                 <mc:Choice xmlns:v="urn:schemas-microsoft-com:vml" Requires="v">
-                  <p:oleObj spid="_x0000_s1117" name="Image" r:id="rId12" imgW="4571280" imgH="1688760" progId="Photoshop.Image.13">
+                  <p:oleObj spid="_x0000_s1130" name="Image" r:id="rId12" imgW="4571280" imgH="1688760" progId="Photoshop.Image.13">
                     <p:embed/>
                   </p:oleObj>
                 </mc:Choice>
@@ -6720,7 +6720,7 @@
             <a:graphicData uri="http://schemas.openxmlformats.org/presentationml/2006/ole">
               <mc:AlternateContent xmlns:mc="http://schemas.openxmlformats.org/markup-compatibility/2006">
                 <mc:Choice xmlns:v="urn:schemas-microsoft-com:vml" Requires="v">
-                  <p:oleObj spid="_x0000_s1118" name="Image" r:id="rId15" imgW="1574280" imgH="1053720" progId="Photoshop.Image.13">
+                  <p:oleObj spid="_x0000_s1131" name="Image" r:id="rId15" imgW="1574280" imgH="1053720" progId="Photoshop.Image.13">
                     <p:embed/>
                   </p:oleObj>
                 </mc:Choice>
@@ -8717,7 +8717,7 @@
             <a:graphicData uri="http://schemas.openxmlformats.org/presentationml/2006/ole">
               <mc:AlternateContent xmlns:mc="http://schemas.openxmlformats.org/markup-compatibility/2006">
                 <mc:Choice xmlns:v="urn:schemas-microsoft-com:vml" Requires="v">
-                  <p:oleObj spid="_x0000_s2139" name="Image" r:id="rId4" imgW="4571280" imgH="1688760" progId="Photoshop.Image.13">
+                  <p:oleObj spid="_x0000_s2152" name="Image" r:id="rId4" imgW="4571280" imgH="1688760" progId="Photoshop.Image.13">
                     <p:embed/>
                   </p:oleObj>
                 </mc:Choice>
@@ -8801,7 +8801,7 @@
             <a:graphicData uri="http://schemas.openxmlformats.org/presentationml/2006/ole">
               <mc:AlternateContent xmlns:mc="http://schemas.openxmlformats.org/markup-compatibility/2006">
                 <mc:Choice xmlns:v="urn:schemas-microsoft-com:vml" Requires="v">
-                  <p:oleObj spid="_x0000_s2140" name="Image" r:id="rId7" imgW="1574280" imgH="1053720" progId="Photoshop.Image.13">
+                  <p:oleObj spid="_x0000_s2153" name="Image" r:id="rId7" imgW="1574280" imgH="1053720" progId="Photoshop.Image.13">
                     <p:embed/>
                   </p:oleObj>
                 </mc:Choice>
@@ -10341,7 +10341,7 @@
               <a:graphicData uri="http://schemas.openxmlformats.org/presentationml/2006/ole">
                 <mc:AlternateContent xmlns:mc="http://schemas.openxmlformats.org/markup-compatibility/2006">
                   <mc:Choice xmlns:v="urn:schemas-microsoft-com:vml" Requires="v">
-                    <p:oleObj spid="_x0000_s2141" name="Image" r:id="rId15" imgW="1828440" imgH="1117440" progId="Photoshop.Image.13">
+                    <p:oleObj spid="_x0000_s2154" name="Image" r:id="rId15" imgW="1828440" imgH="1117440" progId="Photoshop.Image.13">
                       <p:embed/>
                     </p:oleObj>
                   </mc:Choice>
@@ -10398,7 +10398,7 @@
               <a:graphicData uri="http://schemas.openxmlformats.org/presentationml/2006/ole">
                 <mc:AlternateContent xmlns:mc="http://schemas.openxmlformats.org/markup-compatibility/2006">
                   <mc:Choice xmlns:v="urn:schemas-microsoft-com:vml" Requires="v">
-                    <p:oleObj spid="_x0000_s2142" name="Image" r:id="rId17" imgW="1828440" imgH="1117440" progId="Photoshop.Image.13">
+                    <p:oleObj spid="_x0000_s2155" name="Image" r:id="rId17" imgW="1828440" imgH="1117440" progId="Photoshop.Image.13">
                       <p:embed/>
                     </p:oleObj>
                   </mc:Choice>
@@ -12226,7 +12226,7 @@
             <a:graphicData uri="http://schemas.openxmlformats.org/presentationml/2006/ole">
               <mc:AlternateContent xmlns:mc="http://schemas.openxmlformats.org/markup-compatibility/2006">
                 <mc:Choice xmlns:v="urn:schemas-microsoft-com:vml" Requires="v">
-                  <p:oleObj spid="_x0000_s3163" name="Image" r:id="rId4" imgW="4571280" imgH="1688760" progId="Photoshop.Image.13">
+                  <p:oleObj spid="_x0000_s3176" name="Image" r:id="rId4" imgW="4571280" imgH="1688760" progId="Photoshop.Image.13">
                     <p:embed/>
                   </p:oleObj>
                 </mc:Choice>
@@ -12310,7 +12310,7 @@
             <a:graphicData uri="http://schemas.openxmlformats.org/presentationml/2006/ole">
               <mc:AlternateContent xmlns:mc="http://schemas.openxmlformats.org/markup-compatibility/2006">
                 <mc:Choice xmlns:v="urn:schemas-microsoft-com:vml" Requires="v">
-                  <p:oleObj spid="_x0000_s3164" name="Image" r:id="rId7" imgW="1574280" imgH="1053720" progId="Photoshop.Image.13">
+                  <p:oleObj spid="_x0000_s3177" name="Image" r:id="rId7" imgW="1574280" imgH="1053720" progId="Photoshop.Image.13">
                     <p:embed/>
                   </p:oleObj>
                 </mc:Choice>
@@ -13850,7 +13850,7 @@
               <a:graphicData uri="http://schemas.openxmlformats.org/presentationml/2006/ole">
                 <mc:AlternateContent xmlns:mc="http://schemas.openxmlformats.org/markup-compatibility/2006">
                   <mc:Choice xmlns:v="urn:schemas-microsoft-com:vml" Requires="v">
-                    <p:oleObj spid="_x0000_s3165" name="Image" r:id="rId15" imgW="1828440" imgH="1117440" progId="Photoshop.Image.13">
+                    <p:oleObj spid="_x0000_s3178" name="Image" r:id="rId15" imgW="1828440" imgH="1117440" progId="Photoshop.Image.13">
                       <p:embed/>
                     </p:oleObj>
                   </mc:Choice>
@@ -13907,7 +13907,7 @@
               <a:graphicData uri="http://schemas.openxmlformats.org/presentationml/2006/ole">
                 <mc:AlternateContent xmlns:mc="http://schemas.openxmlformats.org/markup-compatibility/2006">
                   <mc:Choice xmlns:v="urn:schemas-microsoft-com:vml" Requires="v">
-                    <p:oleObj spid="_x0000_s3166" name="Image" r:id="rId17" imgW="1828440" imgH="1117440" progId="Photoshop.Image.13">
+                    <p:oleObj spid="_x0000_s3179" name="Image" r:id="rId17" imgW="1828440" imgH="1117440" progId="Photoshop.Image.13">
                       <p:embed/>
                     </p:oleObj>
                   </mc:Choice>
@@ -14476,7 +14476,6 @@
               <a:rPr lang="en-US" sz="3600" dirty="0"/>
               <a:t>or tab for short, provides an easy way for a string players (guitar players, bass players) to figure out how to play their part without requiring any formal training. </a:t>
             </a:r>
-            <a:endParaRPr lang="en-US" sz="3600" dirty="0"/>
           </a:p>
           <a:p>
             <a:pPr algn="just"/>
@@ -14840,7 +14839,7 @@
         <p:spPr>
           <a:xfrm>
             <a:off x="22258339" y="7187434"/>
-            <a:ext cx="10048874" cy="10655202"/>
+            <a:ext cx="10048874" cy="20959562"/>
           </a:xfrm>
         </p:spPr>
         <p:txBody>
@@ -14858,7 +14857,7 @@
           <a:p>
             <a:r>
               <a:rPr lang="en-US" sz="3600" dirty="0" smtClean="0"/>
-              <a:t>The iOS application was prepared with Swift. A screenshot is below,</a:t>
+              <a:t>On launching the app, users are greeted with a title screen asking for the group that they would like to join or create, and then the name:</a:t>
             </a:r>
           </a:p>
           <a:p>
@@ -14883,10 +14882,56 @@
             <a:endParaRPr lang="en-US" sz="3600" dirty="0"/>
           </a:p>
           <a:p>
+            <a:r>
+              <a:rPr lang="en-US" sz="3600" dirty="0" smtClean="0"/>
+              <a:t>After entering that data, the bandleader, or creator of the group, selects the songs that they want to play.</a:t>
+            </a:r>
+          </a:p>
+          <a:p>
+            <a:endParaRPr lang="en-US" sz="3600" dirty="0"/>
+          </a:p>
+          <a:p>
             <a:endParaRPr lang="en-US" sz="3600" dirty="0" smtClean="0"/>
           </a:p>
           <a:p>
-            <a:endParaRPr lang="en-US" sz="3600"/>
+            <a:endParaRPr lang="en-US" sz="3600" dirty="0"/>
+          </a:p>
+          <a:p>
+            <a:endParaRPr lang="en-US" sz="3600" dirty="0" smtClean="0"/>
+          </a:p>
+          <a:p>
+            <a:endParaRPr lang="en-US" sz="3600" dirty="0"/>
+          </a:p>
+          <a:p>
+            <a:r>
+              <a:rPr lang="en-US" sz="3600" dirty="0" smtClean="0"/>
+              <a:t>Finally, the </a:t>
+            </a:r>
+            <a:endParaRPr lang="en-US" sz="3600" dirty="0" smtClean="0"/>
+          </a:p>
+          <a:p>
+            <a:endParaRPr lang="en-US" sz="3600" dirty="0"/>
+          </a:p>
+          <a:p>
+            <a:endParaRPr lang="en-US" sz="3600" dirty="0" smtClean="0"/>
+          </a:p>
+          <a:p>
+            <a:endParaRPr lang="en-US" sz="3600" dirty="0"/>
+          </a:p>
+          <a:p>
+            <a:endParaRPr lang="en-US" sz="3600" dirty="0" smtClean="0"/>
+          </a:p>
+          <a:p>
+            <a:endParaRPr lang="en-US" sz="3600" dirty="0"/>
+          </a:p>
+          <a:p>
+            <a:endParaRPr lang="en-US" sz="3600" dirty="0" smtClean="0"/>
+          </a:p>
+          <a:p>
+            <a:endParaRPr lang="en-US" sz="3600" dirty="0"/>
+          </a:p>
+          <a:p>
+            <a:endParaRPr lang="en-US" sz="3600" dirty="0" smtClean="0"/>
           </a:p>
           <a:p>
             <a:endParaRPr lang="en-US" sz="3600" dirty="0"/>
@@ -14978,7 +15023,7 @@
         <p:spPr>
           <a:xfrm>
             <a:off x="32914027" y="7224842"/>
-            <a:ext cx="10047018" cy="1680438"/>
+            <a:ext cx="10047018" cy="9742358"/>
           </a:xfrm>
         </p:spPr>
         <p:txBody>
@@ -15217,7 +15262,7 @@
         </p:blipFill>
         <p:spPr>
           <a:xfrm>
-            <a:off x="23037800" y="11269044"/>
+            <a:off x="23033233" y="22686491"/>
             <a:ext cx="8483600" cy="5016500"/>
           </a:xfrm>
           <a:prstGeom prst="rect">

</xml_diff>